<commit_message>
aktualizacja grafiki w prezentacji
</commit_message>
<xml_diff>
--- a/Ekonometria przestrzenna.pptx
+++ b/Ekonometria przestrzenna.pptx
@@ -5,10 +5,10 @@
     <p:sldMasterId id="2147483666" r:id="rId4"/>
   </p:sldMasterIdLst>
   <p:notesMasterIdLst>
-    <p:notesMasterId r:id="rId19"/>
+    <p:notesMasterId r:id="rId23"/>
   </p:notesMasterIdLst>
   <p:handoutMasterIdLst>
-    <p:handoutMasterId r:id="rId20"/>
+    <p:handoutMasterId r:id="rId24"/>
   </p:handoutMasterIdLst>
   <p:sldIdLst>
     <p:sldId id="256" r:id="rId5"/>
@@ -25,6 +25,10 @@
     <p:sldId id="302" r:id="rId16"/>
     <p:sldId id="303" r:id="rId17"/>
     <p:sldId id="304" r:id="rId18"/>
+    <p:sldId id="305" r:id="rId19"/>
+    <p:sldId id="306" r:id="rId20"/>
+    <p:sldId id="307" r:id="rId21"/>
+    <p:sldId id="308" r:id="rId22"/>
   </p:sldIdLst>
   <p:sldSz cx="12192000" cy="6858000"/>
   <p:notesSz cx="6858000" cy="9144000"/>
@@ -17047,6 +17051,806 @@
     <p:extLst>
       <p:ext uri="{BB962C8B-B14F-4D97-AF65-F5344CB8AC3E}">
         <p14:creationId xmlns:p14="http://schemas.microsoft.com/office/powerpoint/2010/main" val="2340775051"/>
+      </p:ext>
+    </p:extLst>
+  </p:cSld>
+  <p:clrMapOvr>
+    <a:masterClrMapping/>
+  </p:clrMapOvr>
+</p:sld>
+</file>
+
+<file path=ppt/slides/slide15.xml><?xml version="1.0" encoding="utf-8"?>
+<p:sld xmlns:a="http://schemas.openxmlformats.org/drawingml/2006/main" xmlns:r="http://schemas.openxmlformats.org/officeDocument/2006/relationships" xmlns:p="http://schemas.openxmlformats.org/presentationml/2006/main">
+  <p:cSld>
+    <p:spTree>
+      <p:nvGrpSpPr>
+        <p:cNvPr id="1" name="">
+          <a:extLst>
+            <a:ext uri="{FF2B5EF4-FFF2-40B4-BE49-F238E27FC236}">
+              <a16:creationId xmlns:a16="http://schemas.microsoft.com/office/drawing/2014/main" id="{2D5583AD-7849-6538-DC83-2B8632E79D94}"/>
+            </a:ext>
+          </a:extLst>
+        </p:cNvPr>
+        <p:cNvGrpSpPr/>
+        <p:nvPr/>
+      </p:nvGrpSpPr>
+      <p:grpSpPr>
+        <a:xfrm>
+          <a:off x="0" y="0"/>
+          <a:ext cx="0" cy="0"/>
+          <a:chOff x="0" y="0"/>
+          <a:chExt cx="0" cy="0"/>
+        </a:xfrm>
+      </p:grpSpPr>
+      <p:sp>
+        <p:nvSpPr>
+          <p:cNvPr id="2" name="Title 1">
+            <a:extLst>
+              <a:ext uri="{FF2B5EF4-FFF2-40B4-BE49-F238E27FC236}">
+                <a16:creationId xmlns:a16="http://schemas.microsoft.com/office/drawing/2014/main" id="{BC85CD39-90ED-B20C-71CB-6F168664825A}"/>
+              </a:ext>
+            </a:extLst>
+          </p:cNvPr>
+          <p:cNvSpPr>
+            <a:spLocks noGrp="1"/>
+          </p:cNvSpPr>
+          <p:nvPr>
+            <p:ph type="title"/>
+          </p:nvPr>
+        </p:nvSpPr>
+        <p:spPr>
+          <a:xfrm>
+            <a:off x="1560512" y="229395"/>
+            <a:ext cx="8421688" cy="1325563"/>
+          </a:xfrm>
+        </p:spPr>
+        <p:txBody>
+          <a:bodyPr/>
+          <a:lstStyle/>
+          <a:p>
+            <a:r>
+              <a:rPr lang="en-US" dirty="0"/>
+              <a:t>MARKET OVERVIEW</a:t>
+            </a:r>
+          </a:p>
+        </p:txBody>
+      </p:sp>
+      <p:sp>
+        <p:nvSpPr>
+          <p:cNvPr id="9" name="Date Placeholder 8">
+            <a:extLst>
+              <a:ext uri="{FF2B5EF4-FFF2-40B4-BE49-F238E27FC236}">
+                <a16:creationId xmlns:a16="http://schemas.microsoft.com/office/drawing/2014/main" id="{5246802C-D77B-6F8F-0CD9-F463832CA68F}"/>
+              </a:ext>
+            </a:extLst>
+          </p:cNvPr>
+          <p:cNvSpPr>
+            <a:spLocks noGrp="1"/>
+          </p:cNvSpPr>
+          <p:nvPr>
+            <p:ph type="dt" sz="half" idx="10"/>
+          </p:nvPr>
+        </p:nvSpPr>
+        <p:spPr>
+          <a:xfrm>
+            <a:off x="838200" y="6356350"/>
+            <a:ext cx="2743200" cy="365125"/>
+          </a:xfrm>
+        </p:spPr>
+        <p:txBody>
+          <a:bodyPr/>
+          <a:lstStyle/>
+          <a:p>
+            <a:r>
+              <a:rPr lang="en-US" dirty="0"/>
+              <a:t>20XX</a:t>
+            </a:r>
+          </a:p>
+        </p:txBody>
+      </p:sp>
+      <p:sp>
+        <p:nvSpPr>
+          <p:cNvPr id="10" name="Footer Placeholder 9">
+            <a:extLst>
+              <a:ext uri="{FF2B5EF4-FFF2-40B4-BE49-F238E27FC236}">
+                <a16:creationId xmlns:a16="http://schemas.microsoft.com/office/drawing/2014/main" id="{445D886D-7105-6328-682B-D6DFA7E88EAA}"/>
+              </a:ext>
+            </a:extLst>
+          </p:cNvPr>
+          <p:cNvSpPr>
+            <a:spLocks noGrp="1"/>
+          </p:cNvSpPr>
+          <p:nvPr>
+            <p:ph type="ftr" sz="quarter" idx="11"/>
+          </p:nvPr>
+        </p:nvSpPr>
+        <p:spPr>
+          <a:xfrm>
+            <a:off x="4038600" y="6356350"/>
+            <a:ext cx="4114800" cy="365125"/>
+          </a:xfrm>
+        </p:spPr>
+        <p:txBody>
+          <a:bodyPr/>
+          <a:lstStyle/>
+          <a:p>
+            <a:r>
+              <a:rPr lang="en-US" dirty="0"/>
+              <a:t>Pitch Deck</a:t>
+            </a:r>
+          </a:p>
+        </p:txBody>
+      </p:sp>
+      <p:sp>
+        <p:nvSpPr>
+          <p:cNvPr id="11" name="Slide Number Placeholder 10">
+            <a:extLst>
+              <a:ext uri="{FF2B5EF4-FFF2-40B4-BE49-F238E27FC236}">
+                <a16:creationId xmlns:a16="http://schemas.microsoft.com/office/drawing/2014/main" id="{7659D58B-AD27-922F-AC29-A6834941392A}"/>
+              </a:ext>
+            </a:extLst>
+          </p:cNvPr>
+          <p:cNvSpPr>
+            <a:spLocks noGrp="1"/>
+          </p:cNvSpPr>
+          <p:nvPr>
+            <p:ph type="sldNum" sz="quarter" idx="12"/>
+          </p:nvPr>
+        </p:nvSpPr>
+        <p:spPr>
+          <a:xfrm>
+            <a:off x="8610600" y="6356350"/>
+            <a:ext cx="2743200" cy="365125"/>
+          </a:xfrm>
+        </p:spPr>
+        <p:txBody>
+          <a:bodyPr/>
+          <a:lstStyle/>
+          <a:p>
+            <a:fld id="{B5CEABB6-07DC-46E8-9B57-56EC44A396E5}" type="slidenum">
+              <a:rPr lang="en-US" smtClean="0"/>
+              <a:pPr/>
+              <a:t>15</a:t>
+            </a:fld>
+            <a:endParaRPr lang="en-US" dirty="0"/>
+          </a:p>
+        </p:txBody>
+      </p:sp>
+      <p:pic>
+        <p:nvPicPr>
+          <p:cNvPr id="3" name="Picture 2">
+            <a:extLst>
+              <a:ext uri="{FF2B5EF4-FFF2-40B4-BE49-F238E27FC236}">
+                <a16:creationId xmlns:a16="http://schemas.microsoft.com/office/drawing/2014/main" id="{612868BE-EA00-A7AC-D612-A2BBC684904D}"/>
+              </a:ext>
+            </a:extLst>
+          </p:cNvPr>
+          <p:cNvPicPr>
+            <a:picLocks noChangeAspect="1"/>
+          </p:cNvPicPr>
+          <p:nvPr/>
+        </p:nvPicPr>
+        <p:blipFill>
+          <a:blip r:embed="rId2"/>
+          <a:stretch>
+            <a:fillRect/>
+          </a:stretch>
+        </p:blipFill>
+        <p:spPr>
+          <a:xfrm>
+            <a:off x="4476750" y="1371600"/>
+            <a:ext cx="6667500" cy="4114800"/>
+          </a:xfrm>
+          <a:prstGeom prst="rect">
+            <a:avLst/>
+          </a:prstGeom>
+        </p:spPr>
+      </p:pic>
+    </p:spTree>
+    <p:extLst>
+      <p:ext uri="{BB962C8B-B14F-4D97-AF65-F5344CB8AC3E}">
+        <p14:creationId xmlns:p14="http://schemas.microsoft.com/office/powerpoint/2010/main" val="3519034137"/>
+      </p:ext>
+    </p:extLst>
+  </p:cSld>
+  <p:clrMapOvr>
+    <a:masterClrMapping/>
+  </p:clrMapOvr>
+</p:sld>
+</file>
+
+<file path=ppt/slides/slide16.xml><?xml version="1.0" encoding="utf-8"?>
+<p:sld xmlns:a="http://schemas.openxmlformats.org/drawingml/2006/main" xmlns:r="http://schemas.openxmlformats.org/officeDocument/2006/relationships" xmlns:p="http://schemas.openxmlformats.org/presentationml/2006/main">
+  <p:cSld>
+    <p:spTree>
+      <p:nvGrpSpPr>
+        <p:cNvPr id="1" name="">
+          <a:extLst>
+            <a:ext uri="{FF2B5EF4-FFF2-40B4-BE49-F238E27FC236}">
+              <a16:creationId xmlns:a16="http://schemas.microsoft.com/office/drawing/2014/main" id="{C255781D-B092-3A0F-46B0-DF27F503CD05}"/>
+            </a:ext>
+          </a:extLst>
+        </p:cNvPr>
+        <p:cNvGrpSpPr/>
+        <p:nvPr/>
+      </p:nvGrpSpPr>
+      <p:grpSpPr>
+        <a:xfrm>
+          <a:off x="0" y="0"/>
+          <a:ext cx="0" cy="0"/>
+          <a:chOff x="0" y="0"/>
+          <a:chExt cx="0" cy="0"/>
+        </a:xfrm>
+      </p:grpSpPr>
+      <p:sp>
+        <p:nvSpPr>
+          <p:cNvPr id="2" name="Title 1">
+            <a:extLst>
+              <a:ext uri="{FF2B5EF4-FFF2-40B4-BE49-F238E27FC236}">
+                <a16:creationId xmlns:a16="http://schemas.microsoft.com/office/drawing/2014/main" id="{75E135AF-D207-6597-DCB3-C4572576F225}"/>
+              </a:ext>
+            </a:extLst>
+          </p:cNvPr>
+          <p:cNvSpPr>
+            <a:spLocks noGrp="1"/>
+          </p:cNvSpPr>
+          <p:nvPr>
+            <p:ph type="title"/>
+          </p:nvPr>
+        </p:nvSpPr>
+        <p:spPr>
+          <a:xfrm>
+            <a:off x="1560512" y="229395"/>
+            <a:ext cx="8421688" cy="1325563"/>
+          </a:xfrm>
+        </p:spPr>
+        <p:txBody>
+          <a:bodyPr/>
+          <a:lstStyle/>
+          <a:p>
+            <a:r>
+              <a:rPr lang="en-US" dirty="0"/>
+              <a:t>MARKET OVERVIEW</a:t>
+            </a:r>
+          </a:p>
+        </p:txBody>
+      </p:sp>
+      <p:sp>
+        <p:nvSpPr>
+          <p:cNvPr id="9" name="Date Placeholder 8">
+            <a:extLst>
+              <a:ext uri="{FF2B5EF4-FFF2-40B4-BE49-F238E27FC236}">
+                <a16:creationId xmlns:a16="http://schemas.microsoft.com/office/drawing/2014/main" id="{8E80EA6D-1244-92BA-337D-8C3C4EF577C7}"/>
+              </a:ext>
+            </a:extLst>
+          </p:cNvPr>
+          <p:cNvSpPr>
+            <a:spLocks noGrp="1"/>
+          </p:cNvSpPr>
+          <p:nvPr>
+            <p:ph type="dt" sz="half" idx="10"/>
+          </p:nvPr>
+        </p:nvSpPr>
+        <p:spPr>
+          <a:xfrm>
+            <a:off x="838200" y="6356350"/>
+            <a:ext cx="2743200" cy="365125"/>
+          </a:xfrm>
+        </p:spPr>
+        <p:txBody>
+          <a:bodyPr/>
+          <a:lstStyle/>
+          <a:p>
+            <a:r>
+              <a:rPr lang="en-US" dirty="0"/>
+              <a:t>20XX</a:t>
+            </a:r>
+          </a:p>
+        </p:txBody>
+      </p:sp>
+      <p:sp>
+        <p:nvSpPr>
+          <p:cNvPr id="10" name="Footer Placeholder 9">
+            <a:extLst>
+              <a:ext uri="{FF2B5EF4-FFF2-40B4-BE49-F238E27FC236}">
+                <a16:creationId xmlns:a16="http://schemas.microsoft.com/office/drawing/2014/main" id="{8F3B1507-4B8C-957C-E627-101AC4478036}"/>
+              </a:ext>
+            </a:extLst>
+          </p:cNvPr>
+          <p:cNvSpPr>
+            <a:spLocks noGrp="1"/>
+          </p:cNvSpPr>
+          <p:nvPr>
+            <p:ph type="ftr" sz="quarter" idx="11"/>
+          </p:nvPr>
+        </p:nvSpPr>
+        <p:spPr>
+          <a:xfrm>
+            <a:off x="4038600" y="6356350"/>
+            <a:ext cx="4114800" cy="365125"/>
+          </a:xfrm>
+        </p:spPr>
+        <p:txBody>
+          <a:bodyPr/>
+          <a:lstStyle/>
+          <a:p>
+            <a:r>
+              <a:rPr lang="en-US" dirty="0"/>
+              <a:t>Pitch Deck</a:t>
+            </a:r>
+          </a:p>
+        </p:txBody>
+      </p:sp>
+      <p:sp>
+        <p:nvSpPr>
+          <p:cNvPr id="11" name="Slide Number Placeholder 10">
+            <a:extLst>
+              <a:ext uri="{FF2B5EF4-FFF2-40B4-BE49-F238E27FC236}">
+                <a16:creationId xmlns:a16="http://schemas.microsoft.com/office/drawing/2014/main" id="{E3AE8E13-A47C-3E7A-F767-BAAF45CF46B4}"/>
+              </a:ext>
+            </a:extLst>
+          </p:cNvPr>
+          <p:cNvSpPr>
+            <a:spLocks noGrp="1"/>
+          </p:cNvSpPr>
+          <p:nvPr>
+            <p:ph type="sldNum" sz="quarter" idx="12"/>
+          </p:nvPr>
+        </p:nvSpPr>
+        <p:spPr>
+          <a:xfrm>
+            <a:off x="8610600" y="6356350"/>
+            <a:ext cx="2743200" cy="365125"/>
+          </a:xfrm>
+        </p:spPr>
+        <p:txBody>
+          <a:bodyPr/>
+          <a:lstStyle/>
+          <a:p>
+            <a:fld id="{B5CEABB6-07DC-46E8-9B57-56EC44A396E5}" type="slidenum">
+              <a:rPr lang="en-US" smtClean="0"/>
+              <a:pPr/>
+              <a:t>16</a:t>
+            </a:fld>
+            <a:endParaRPr lang="en-US" dirty="0"/>
+          </a:p>
+        </p:txBody>
+      </p:sp>
+      <p:pic>
+        <p:nvPicPr>
+          <p:cNvPr id="4" name="Picture 3">
+            <a:extLst>
+              <a:ext uri="{FF2B5EF4-FFF2-40B4-BE49-F238E27FC236}">
+                <a16:creationId xmlns:a16="http://schemas.microsoft.com/office/drawing/2014/main" id="{6772990A-7CB5-59DF-F670-4765067BD0F2}"/>
+              </a:ext>
+            </a:extLst>
+          </p:cNvPr>
+          <p:cNvPicPr>
+            <a:picLocks noChangeAspect="1"/>
+          </p:cNvPicPr>
+          <p:nvPr/>
+        </p:nvPicPr>
+        <p:blipFill>
+          <a:blip r:embed="rId2"/>
+          <a:stretch>
+            <a:fillRect/>
+          </a:stretch>
+        </p:blipFill>
+        <p:spPr>
+          <a:xfrm>
+            <a:off x="4600575" y="1554958"/>
+            <a:ext cx="6667500" cy="4114800"/>
+          </a:xfrm>
+          <a:prstGeom prst="rect">
+            <a:avLst/>
+          </a:prstGeom>
+        </p:spPr>
+      </p:pic>
+    </p:spTree>
+    <p:extLst>
+      <p:ext uri="{BB962C8B-B14F-4D97-AF65-F5344CB8AC3E}">
+        <p14:creationId xmlns:p14="http://schemas.microsoft.com/office/powerpoint/2010/main" val="2103076649"/>
+      </p:ext>
+    </p:extLst>
+  </p:cSld>
+  <p:clrMapOvr>
+    <a:masterClrMapping/>
+  </p:clrMapOvr>
+</p:sld>
+</file>
+
+<file path=ppt/slides/slide17.xml><?xml version="1.0" encoding="utf-8"?>
+<p:sld xmlns:a="http://schemas.openxmlformats.org/drawingml/2006/main" xmlns:r="http://schemas.openxmlformats.org/officeDocument/2006/relationships" xmlns:p="http://schemas.openxmlformats.org/presentationml/2006/main">
+  <p:cSld>
+    <p:spTree>
+      <p:nvGrpSpPr>
+        <p:cNvPr id="1" name="">
+          <a:extLst>
+            <a:ext uri="{FF2B5EF4-FFF2-40B4-BE49-F238E27FC236}">
+              <a16:creationId xmlns:a16="http://schemas.microsoft.com/office/drawing/2014/main" id="{7A5B5218-5146-79A0-681F-78576DB8FE38}"/>
+            </a:ext>
+          </a:extLst>
+        </p:cNvPr>
+        <p:cNvGrpSpPr/>
+        <p:nvPr/>
+      </p:nvGrpSpPr>
+      <p:grpSpPr>
+        <a:xfrm>
+          <a:off x="0" y="0"/>
+          <a:ext cx="0" cy="0"/>
+          <a:chOff x="0" y="0"/>
+          <a:chExt cx="0" cy="0"/>
+        </a:xfrm>
+      </p:grpSpPr>
+      <p:sp>
+        <p:nvSpPr>
+          <p:cNvPr id="2" name="Title 1">
+            <a:extLst>
+              <a:ext uri="{FF2B5EF4-FFF2-40B4-BE49-F238E27FC236}">
+                <a16:creationId xmlns:a16="http://schemas.microsoft.com/office/drawing/2014/main" id="{7B9D52CA-6952-1A0A-BBB0-1DAC522F54EC}"/>
+              </a:ext>
+            </a:extLst>
+          </p:cNvPr>
+          <p:cNvSpPr>
+            <a:spLocks noGrp="1"/>
+          </p:cNvSpPr>
+          <p:nvPr>
+            <p:ph type="title"/>
+          </p:nvPr>
+        </p:nvSpPr>
+        <p:spPr>
+          <a:xfrm>
+            <a:off x="1560512" y="229395"/>
+            <a:ext cx="8421688" cy="1325563"/>
+          </a:xfrm>
+        </p:spPr>
+        <p:txBody>
+          <a:bodyPr/>
+          <a:lstStyle/>
+          <a:p>
+            <a:r>
+              <a:rPr lang="en-US" dirty="0"/>
+              <a:t>MARKET OVERVIEW</a:t>
+            </a:r>
+          </a:p>
+        </p:txBody>
+      </p:sp>
+      <p:sp>
+        <p:nvSpPr>
+          <p:cNvPr id="9" name="Date Placeholder 8">
+            <a:extLst>
+              <a:ext uri="{FF2B5EF4-FFF2-40B4-BE49-F238E27FC236}">
+                <a16:creationId xmlns:a16="http://schemas.microsoft.com/office/drawing/2014/main" id="{B4FA31FD-8498-DB1F-1E78-A65D48ADE1C8}"/>
+              </a:ext>
+            </a:extLst>
+          </p:cNvPr>
+          <p:cNvSpPr>
+            <a:spLocks noGrp="1"/>
+          </p:cNvSpPr>
+          <p:nvPr>
+            <p:ph type="dt" sz="half" idx="10"/>
+          </p:nvPr>
+        </p:nvSpPr>
+        <p:spPr>
+          <a:xfrm>
+            <a:off x="838200" y="6356350"/>
+            <a:ext cx="2743200" cy="365125"/>
+          </a:xfrm>
+        </p:spPr>
+        <p:txBody>
+          <a:bodyPr/>
+          <a:lstStyle/>
+          <a:p>
+            <a:r>
+              <a:rPr lang="en-US" dirty="0"/>
+              <a:t>20XX</a:t>
+            </a:r>
+          </a:p>
+        </p:txBody>
+      </p:sp>
+      <p:sp>
+        <p:nvSpPr>
+          <p:cNvPr id="10" name="Footer Placeholder 9">
+            <a:extLst>
+              <a:ext uri="{FF2B5EF4-FFF2-40B4-BE49-F238E27FC236}">
+                <a16:creationId xmlns:a16="http://schemas.microsoft.com/office/drawing/2014/main" id="{4044E3A9-D818-9454-F7F2-E6BF13813091}"/>
+              </a:ext>
+            </a:extLst>
+          </p:cNvPr>
+          <p:cNvSpPr>
+            <a:spLocks noGrp="1"/>
+          </p:cNvSpPr>
+          <p:nvPr>
+            <p:ph type="ftr" sz="quarter" idx="11"/>
+          </p:nvPr>
+        </p:nvSpPr>
+        <p:spPr>
+          <a:xfrm>
+            <a:off x="4038600" y="6356350"/>
+            <a:ext cx="4114800" cy="365125"/>
+          </a:xfrm>
+        </p:spPr>
+        <p:txBody>
+          <a:bodyPr/>
+          <a:lstStyle/>
+          <a:p>
+            <a:r>
+              <a:rPr lang="en-US" dirty="0"/>
+              <a:t>Pitch Deck</a:t>
+            </a:r>
+          </a:p>
+        </p:txBody>
+      </p:sp>
+      <p:sp>
+        <p:nvSpPr>
+          <p:cNvPr id="11" name="Slide Number Placeholder 10">
+            <a:extLst>
+              <a:ext uri="{FF2B5EF4-FFF2-40B4-BE49-F238E27FC236}">
+                <a16:creationId xmlns:a16="http://schemas.microsoft.com/office/drawing/2014/main" id="{0F8F46C2-36F7-2B51-C1D8-EB50E70B3D6D}"/>
+              </a:ext>
+            </a:extLst>
+          </p:cNvPr>
+          <p:cNvSpPr>
+            <a:spLocks noGrp="1"/>
+          </p:cNvSpPr>
+          <p:nvPr>
+            <p:ph type="sldNum" sz="quarter" idx="12"/>
+          </p:nvPr>
+        </p:nvSpPr>
+        <p:spPr>
+          <a:xfrm>
+            <a:off x="8610600" y="6356350"/>
+            <a:ext cx="2743200" cy="365125"/>
+          </a:xfrm>
+        </p:spPr>
+        <p:txBody>
+          <a:bodyPr/>
+          <a:lstStyle/>
+          <a:p>
+            <a:fld id="{B5CEABB6-07DC-46E8-9B57-56EC44A396E5}" type="slidenum">
+              <a:rPr lang="en-US" smtClean="0"/>
+              <a:pPr/>
+              <a:t>17</a:t>
+            </a:fld>
+            <a:endParaRPr lang="en-US" dirty="0"/>
+          </a:p>
+        </p:txBody>
+      </p:sp>
+      <p:pic>
+        <p:nvPicPr>
+          <p:cNvPr id="3" name="Picture 2">
+            <a:extLst>
+              <a:ext uri="{FF2B5EF4-FFF2-40B4-BE49-F238E27FC236}">
+                <a16:creationId xmlns:a16="http://schemas.microsoft.com/office/drawing/2014/main" id="{A100AEA6-2192-F118-CDAE-6BB71193E12E}"/>
+              </a:ext>
+            </a:extLst>
+          </p:cNvPr>
+          <p:cNvPicPr>
+            <a:picLocks noChangeAspect="1"/>
+          </p:cNvPicPr>
+          <p:nvPr/>
+        </p:nvPicPr>
+        <p:blipFill>
+          <a:blip r:embed="rId2"/>
+          <a:stretch>
+            <a:fillRect/>
+          </a:stretch>
+        </p:blipFill>
+        <p:spPr>
+          <a:xfrm>
+            <a:off x="4819650" y="1554958"/>
+            <a:ext cx="6667500" cy="4114800"/>
+          </a:xfrm>
+          <a:prstGeom prst="rect">
+            <a:avLst/>
+          </a:prstGeom>
+        </p:spPr>
+      </p:pic>
+    </p:spTree>
+    <p:extLst>
+      <p:ext uri="{BB962C8B-B14F-4D97-AF65-F5344CB8AC3E}">
+        <p14:creationId xmlns:p14="http://schemas.microsoft.com/office/powerpoint/2010/main" val="304014284"/>
+      </p:ext>
+    </p:extLst>
+  </p:cSld>
+  <p:clrMapOvr>
+    <a:masterClrMapping/>
+  </p:clrMapOvr>
+</p:sld>
+</file>
+
+<file path=ppt/slides/slide18.xml><?xml version="1.0" encoding="utf-8"?>
+<p:sld xmlns:a="http://schemas.openxmlformats.org/drawingml/2006/main" xmlns:r="http://schemas.openxmlformats.org/officeDocument/2006/relationships" xmlns:p="http://schemas.openxmlformats.org/presentationml/2006/main">
+  <p:cSld>
+    <p:spTree>
+      <p:nvGrpSpPr>
+        <p:cNvPr id="1" name="">
+          <a:extLst>
+            <a:ext uri="{FF2B5EF4-FFF2-40B4-BE49-F238E27FC236}">
+              <a16:creationId xmlns:a16="http://schemas.microsoft.com/office/drawing/2014/main" id="{5F34708D-24CA-4D67-66DC-BEE28E256701}"/>
+            </a:ext>
+          </a:extLst>
+        </p:cNvPr>
+        <p:cNvGrpSpPr/>
+        <p:nvPr/>
+      </p:nvGrpSpPr>
+      <p:grpSpPr>
+        <a:xfrm>
+          <a:off x="0" y="0"/>
+          <a:ext cx="0" cy="0"/>
+          <a:chOff x="0" y="0"/>
+          <a:chExt cx="0" cy="0"/>
+        </a:xfrm>
+      </p:grpSpPr>
+      <p:sp>
+        <p:nvSpPr>
+          <p:cNvPr id="2" name="Title 1">
+            <a:extLst>
+              <a:ext uri="{FF2B5EF4-FFF2-40B4-BE49-F238E27FC236}">
+                <a16:creationId xmlns:a16="http://schemas.microsoft.com/office/drawing/2014/main" id="{30277119-A7E3-AFBA-65C5-92596AC8AA78}"/>
+              </a:ext>
+            </a:extLst>
+          </p:cNvPr>
+          <p:cNvSpPr>
+            <a:spLocks noGrp="1"/>
+          </p:cNvSpPr>
+          <p:nvPr>
+            <p:ph type="title"/>
+          </p:nvPr>
+        </p:nvSpPr>
+        <p:spPr>
+          <a:xfrm>
+            <a:off x="1560512" y="229395"/>
+            <a:ext cx="8421688" cy="1325563"/>
+          </a:xfrm>
+        </p:spPr>
+        <p:txBody>
+          <a:bodyPr/>
+          <a:lstStyle/>
+          <a:p>
+            <a:r>
+              <a:rPr lang="en-US" dirty="0"/>
+              <a:t>MARKET OVERVIEW</a:t>
+            </a:r>
+          </a:p>
+        </p:txBody>
+      </p:sp>
+      <p:sp>
+        <p:nvSpPr>
+          <p:cNvPr id="9" name="Date Placeholder 8">
+            <a:extLst>
+              <a:ext uri="{FF2B5EF4-FFF2-40B4-BE49-F238E27FC236}">
+                <a16:creationId xmlns:a16="http://schemas.microsoft.com/office/drawing/2014/main" id="{05EF780F-E8A7-F88D-FF69-C4CF95B077B0}"/>
+              </a:ext>
+            </a:extLst>
+          </p:cNvPr>
+          <p:cNvSpPr>
+            <a:spLocks noGrp="1"/>
+          </p:cNvSpPr>
+          <p:nvPr>
+            <p:ph type="dt" sz="half" idx="10"/>
+          </p:nvPr>
+        </p:nvSpPr>
+        <p:spPr>
+          <a:xfrm>
+            <a:off x="838200" y="6356350"/>
+            <a:ext cx="2743200" cy="365125"/>
+          </a:xfrm>
+        </p:spPr>
+        <p:txBody>
+          <a:bodyPr/>
+          <a:lstStyle/>
+          <a:p>
+            <a:r>
+              <a:rPr lang="en-US" dirty="0"/>
+              <a:t>20XX</a:t>
+            </a:r>
+          </a:p>
+        </p:txBody>
+      </p:sp>
+      <p:sp>
+        <p:nvSpPr>
+          <p:cNvPr id="10" name="Footer Placeholder 9">
+            <a:extLst>
+              <a:ext uri="{FF2B5EF4-FFF2-40B4-BE49-F238E27FC236}">
+                <a16:creationId xmlns:a16="http://schemas.microsoft.com/office/drawing/2014/main" id="{A2939AFD-EB64-6BF9-02CA-9AB7723492B0}"/>
+              </a:ext>
+            </a:extLst>
+          </p:cNvPr>
+          <p:cNvSpPr>
+            <a:spLocks noGrp="1"/>
+          </p:cNvSpPr>
+          <p:nvPr>
+            <p:ph type="ftr" sz="quarter" idx="11"/>
+          </p:nvPr>
+        </p:nvSpPr>
+        <p:spPr>
+          <a:xfrm>
+            <a:off x="4038600" y="6356350"/>
+            <a:ext cx="4114800" cy="365125"/>
+          </a:xfrm>
+        </p:spPr>
+        <p:txBody>
+          <a:bodyPr/>
+          <a:lstStyle/>
+          <a:p>
+            <a:r>
+              <a:rPr lang="en-US" dirty="0"/>
+              <a:t>Pitch Deck</a:t>
+            </a:r>
+          </a:p>
+        </p:txBody>
+      </p:sp>
+      <p:sp>
+        <p:nvSpPr>
+          <p:cNvPr id="11" name="Slide Number Placeholder 10">
+            <a:extLst>
+              <a:ext uri="{FF2B5EF4-FFF2-40B4-BE49-F238E27FC236}">
+                <a16:creationId xmlns:a16="http://schemas.microsoft.com/office/drawing/2014/main" id="{0FF8FAA6-EC22-4989-7A0E-50E6B3D1BCD1}"/>
+              </a:ext>
+            </a:extLst>
+          </p:cNvPr>
+          <p:cNvSpPr>
+            <a:spLocks noGrp="1"/>
+          </p:cNvSpPr>
+          <p:nvPr>
+            <p:ph type="sldNum" sz="quarter" idx="12"/>
+          </p:nvPr>
+        </p:nvSpPr>
+        <p:spPr>
+          <a:xfrm>
+            <a:off x="8610600" y="6356350"/>
+            <a:ext cx="2743200" cy="365125"/>
+          </a:xfrm>
+        </p:spPr>
+        <p:txBody>
+          <a:bodyPr/>
+          <a:lstStyle/>
+          <a:p>
+            <a:fld id="{B5CEABB6-07DC-46E8-9B57-56EC44A396E5}" type="slidenum">
+              <a:rPr lang="en-US" smtClean="0"/>
+              <a:pPr/>
+              <a:t>18</a:t>
+            </a:fld>
+            <a:endParaRPr lang="en-US" dirty="0"/>
+          </a:p>
+        </p:txBody>
+      </p:sp>
+      <p:pic>
+        <p:nvPicPr>
+          <p:cNvPr id="4" name="Picture 3">
+            <a:extLst>
+              <a:ext uri="{FF2B5EF4-FFF2-40B4-BE49-F238E27FC236}">
+                <a16:creationId xmlns:a16="http://schemas.microsoft.com/office/drawing/2014/main" id="{A0B6090D-5772-99AD-5EFE-0541A85E4A51}"/>
+              </a:ext>
+            </a:extLst>
+          </p:cNvPr>
+          <p:cNvPicPr>
+            <a:picLocks noChangeAspect="1"/>
+          </p:cNvPicPr>
+          <p:nvPr/>
+        </p:nvPicPr>
+        <p:blipFill>
+          <a:blip r:embed="rId2"/>
+          <a:stretch>
+            <a:fillRect/>
+          </a:stretch>
+        </p:blipFill>
+        <p:spPr>
+          <a:xfrm>
+            <a:off x="4686300" y="1554958"/>
+            <a:ext cx="6667500" cy="4114800"/>
+          </a:xfrm>
+          <a:prstGeom prst="rect">
+            <a:avLst/>
+          </a:prstGeom>
+        </p:spPr>
+      </p:pic>
+    </p:spTree>
+    <p:extLst>
+      <p:ext uri="{BB962C8B-B14F-4D97-AF65-F5344CB8AC3E}">
+        <p14:creationId xmlns:p14="http://schemas.microsoft.com/office/powerpoint/2010/main" val="1747858255"/>
       </p:ext>
     </p:extLst>
   </p:cSld>

</xml_diff>